<commit_message>
added place new file into local repo section
</commit_message>
<xml_diff>
--- a/Github Commands.pptx
+++ b/Github Commands.pptx
@@ -8,9 +8,17 @@
     <p:sldId id="256" r:id="rId2"/>
     <p:sldId id="257" r:id="rId3"/>
     <p:sldId id="258" r:id="rId4"/>
-    <p:sldId id="259" r:id="rId5"/>
-    <p:sldId id="260" r:id="rId6"/>
-    <p:sldId id="261" r:id="rId7"/>
+    <p:sldId id="268" r:id="rId5"/>
+    <p:sldId id="259" r:id="rId6"/>
+    <p:sldId id="269" r:id="rId7"/>
+    <p:sldId id="260" r:id="rId8"/>
+    <p:sldId id="261" r:id="rId9"/>
+    <p:sldId id="262" r:id="rId10"/>
+    <p:sldId id="263" r:id="rId11"/>
+    <p:sldId id="264" r:id="rId12"/>
+    <p:sldId id="265" r:id="rId13"/>
+    <p:sldId id="266" r:id="rId14"/>
+    <p:sldId id="267" r:id="rId15"/>
   </p:sldIdLst>
   <p:sldSz cx="9144000" cy="6858000" type="screen4x3"/>
   <p:notesSz cx="6858000" cy="9144000"/>
@@ -293,7 +301,7 @@
           <a:p>
             <a:fld id="{8839E6B8-AE44-4E4D-B3CE-5639A35B70C6}" type="datetimeFigureOut">
               <a:rPr lang="en-SG" smtClean="0"/>
-              <a:t>28/3/2013</a:t>
+              <a:t>31/3/2013</a:t>
             </a:fld>
             <a:endParaRPr lang="en-SG"/>
           </a:p>
@@ -463,7 +471,7 @@
           <a:p>
             <a:fld id="{8839E6B8-AE44-4E4D-B3CE-5639A35B70C6}" type="datetimeFigureOut">
               <a:rPr lang="en-SG" smtClean="0"/>
-              <a:t>28/3/2013</a:t>
+              <a:t>31/3/2013</a:t>
             </a:fld>
             <a:endParaRPr lang="en-SG"/>
           </a:p>
@@ -643,7 +651,7 @@
           <a:p>
             <a:fld id="{8839E6B8-AE44-4E4D-B3CE-5639A35B70C6}" type="datetimeFigureOut">
               <a:rPr lang="en-SG" smtClean="0"/>
-              <a:t>28/3/2013</a:t>
+              <a:t>31/3/2013</a:t>
             </a:fld>
             <a:endParaRPr lang="en-SG"/>
           </a:p>
@@ -813,7 +821,7 @@
           <a:p>
             <a:fld id="{8839E6B8-AE44-4E4D-B3CE-5639A35B70C6}" type="datetimeFigureOut">
               <a:rPr lang="en-SG" smtClean="0"/>
-              <a:t>28/3/2013</a:t>
+              <a:t>31/3/2013</a:t>
             </a:fld>
             <a:endParaRPr lang="en-SG"/>
           </a:p>
@@ -1059,7 +1067,7 @@
           <a:p>
             <a:fld id="{8839E6B8-AE44-4E4D-B3CE-5639A35B70C6}" type="datetimeFigureOut">
               <a:rPr lang="en-SG" smtClean="0"/>
-              <a:t>28/3/2013</a:t>
+              <a:t>31/3/2013</a:t>
             </a:fld>
             <a:endParaRPr lang="en-SG"/>
           </a:p>
@@ -1347,7 +1355,7 @@
           <a:p>
             <a:fld id="{8839E6B8-AE44-4E4D-B3CE-5639A35B70C6}" type="datetimeFigureOut">
               <a:rPr lang="en-SG" smtClean="0"/>
-              <a:t>28/3/2013</a:t>
+              <a:t>31/3/2013</a:t>
             </a:fld>
             <a:endParaRPr lang="en-SG"/>
           </a:p>
@@ -1769,7 +1777,7 @@
           <a:p>
             <a:fld id="{8839E6B8-AE44-4E4D-B3CE-5639A35B70C6}" type="datetimeFigureOut">
               <a:rPr lang="en-SG" smtClean="0"/>
-              <a:t>28/3/2013</a:t>
+              <a:t>31/3/2013</a:t>
             </a:fld>
             <a:endParaRPr lang="en-SG"/>
           </a:p>
@@ -1887,7 +1895,7 @@
           <a:p>
             <a:fld id="{8839E6B8-AE44-4E4D-B3CE-5639A35B70C6}" type="datetimeFigureOut">
               <a:rPr lang="en-SG" smtClean="0"/>
-              <a:t>28/3/2013</a:t>
+              <a:t>31/3/2013</a:t>
             </a:fld>
             <a:endParaRPr lang="en-SG"/>
           </a:p>
@@ -1982,7 +1990,7 @@
           <a:p>
             <a:fld id="{8839E6B8-AE44-4E4D-B3CE-5639A35B70C6}" type="datetimeFigureOut">
               <a:rPr lang="en-SG" smtClean="0"/>
-              <a:t>28/3/2013</a:t>
+              <a:t>31/3/2013</a:t>
             </a:fld>
             <a:endParaRPr lang="en-SG"/>
           </a:p>
@@ -2259,7 +2267,7 @@
           <a:p>
             <a:fld id="{8839E6B8-AE44-4E4D-B3CE-5639A35B70C6}" type="datetimeFigureOut">
               <a:rPr lang="en-SG" smtClean="0"/>
-              <a:t>28/3/2013</a:t>
+              <a:t>31/3/2013</a:t>
             </a:fld>
             <a:endParaRPr lang="en-SG"/>
           </a:p>
@@ -2512,7 +2520,7 @@
           <a:p>
             <a:fld id="{8839E6B8-AE44-4E4D-B3CE-5639A35B70C6}" type="datetimeFigureOut">
               <a:rPr lang="en-SG" smtClean="0"/>
-              <a:t>28/3/2013</a:t>
+              <a:t>31/3/2013</a:t>
             </a:fld>
             <a:endParaRPr lang="en-SG"/>
           </a:p>
@@ -2725,7 +2733,7 @@
           <a:p>
             <a:fld id="{8839E6B8-AE44-4E4D-B3CE-5639A35B70C6}" type="datetimeFigureOut">
               <a:rPr lang="en-SG" smtClean="0"/>
-              <a:t>28/3/2013</a:t>
+              <a:t>31/3/2013</a:t>
             </a:fld>
             <a:endParaRPr lang="en-SG"/>
           </a:p>
@@ -3158,6 +3166,46 @@
           </a:p>
         </p:txBody>
       </p:sp>
+      <p:sp>
+        <p:nvSpPr>
+          <p:cNvPr id="4" name="Rectangle 3"/>
+          <p:cNvSpPr/>
+          <p:nvPr/>
+        </p:nvSpPr>
+        <p:spPr>
+          <a:xfrm>
+            <a:off x="422469" y="1268760"/>
+            <a:ext cx="2694028" cy="504056"/>
+          </a:xfrm>
+          <a:prstGeom prst="rect">
+            <a:avLst/>
+          </a:prstGeom>
+        </p:spPr>
+        <p:style>
+          <a:lnRef idx="2">
+            <a:schemeClr val="dk1">
+              <a:shade val="50000"/>
+            </a:schemeClr>
+          </a:lnRef>
+          <a:fillRef idx="1">
+            <a:schemeClr val="dk1"/>
+          </a:fillRef>
+          <a:effectRef idx="0">
+            <a:schemeClr val="dk1"/>
+          </a:effectRef>
+          <a:fontRef idx="minor">
+            <a:schemeClr val="lt1"/>
+          </a:fontRef>
+        </p:style>
+        <p:txBody>
+          <a:bodyPr rtlCol="0" anchor="ctr"/>
+          <a:lstStyle/>
+          <a:p>
+            <a:pPr algn="ctr"/>
+            <a:endParaRPr lang="en-SG" dirty="0"/>
+          </a:p>
+        </p:txBody>
+      </p:sp>
     </p:spTree>
     <p:extLst>
       <p:ext uri="{BB962C8B-B14F-4D97-AF65-F5344CB8AC3E}">
@@ -3168,6 +3216,422 @@
   <p:clrMapOvr>
     <a:masterClrMapping/>
   </p:clrMapOvr>
+  <p:timing>
+    <p:tnLst>
+      <p:par>
+        <p:cTn id="1" dur="indefinite" restart="never" nodeType="tmRoot"/>
+      </p:par>
+    </p:tnLst>
+  </p:timing>
+</p:sld>
+</file>
+
+<file path=ppt/slides/slide10.xml><?xml version="1.0" encoding="utf-8"?>
+<p:sld xmlns:a="http://schemas.openxmlformats.org/drawingml/2006/main" xmlns:r="http://schemas.openxmlformats.org/officeDocument/2006/relationships" xmlns:p="http://schemas.openxmlformats.org/presentationml/2006/main">
+  <p:cSld>
+    <p:spTree>
+      <p:nvGrpSpPr>
+        <p:cNvPr id="1" name=""/>
+        <p:cNvGrpSpPr/>
+        <p:nvPr/>
+      </p:nvGrpSpPr>
+      <p:grpSpPr>
+        <a:xfrm>
+          <a:off x="0" y="0"/>
+          <a:ext cx="0" cy="0"/>
+          <a:chOff x="0" y="0"/>
+          <a:chExt cx="0" cy="0"/>
+        </a:xfrm>
+      </p:grpSpPr>
+      <p:sp>
+        <p:nvSpPr>
+          <p:cNvPr id="2" name="Title 1"/>
+          <p:cNvSpPr>
+            <a:spLocks noGrp="1"/>
+          </p:cNvSpPr>
+          <p:nvPr>
+            <p:ph type="title"/>
+          </p:nvPr>
+        </p:nvSpPr>
+        <p:spPr/>
+        <p:txBody>
+          <a:bodyPr>
+            <a:normAutofit/>
+          </a:bodyPr>
+          <a:lstStyle/>
+          <a:p>
+            <a:r>
+              <a:rPr lang="en-US" dirty="0"/>
+              <a:t>Commit </a:t>
+            </a:r>
+            <a:r>
+              <a:rPr lang="en-US" dirty="0" smtClean="0"/>
+              <a:t>changes</a:t>
+            </a:r>
+            <a:endParaRPr lang="en-SG" dirty="0"/>
+          </a:p>
+        </p:txBody>
+      </p:sp>
+      <p:sp>
+        <p:nvSpPr>
+          <p:cNvPr id="3" name="Content Placeholder 2"/>
+          <p:cNvSpPr>
+            <a:spLocks noGrp="1"/>
+          </p:cNvSpPr>
+          <p:nvPr>
+            <p:ph idx="1"/>
+          </p:nvPr>
+        </p:nvSpPr>
+        <p:spPr/>
+        <p:txBody>
+          <a:bodyPr/>
+          <a:lstStyle/>
+          <a:p>
+            <a:endParaRPr lang="en-SG"/>
+          </a:p>
+        </p:txBody>
+      </p:sp>
+    </p:spTree>
+    <p:extLst>
+      <p:ext uri="{BB962C8B-B14F-4D97-AF65-F5344CB8AC3E}">
+        <p14:creationId xmlns:p14="http://schemas.microsoft.com/office/powerpoint/2010/main" val="740072593"/>
+      </p:ext>
+    </p:extLst>
+  </p:cSld>
+  <p:clrMapOvr>
+    <a:masterClrMapping/>
+  </p:clrMapOvr>
+  <p:timing>
+    <p:tnLst>
+      <p:par>
+        <p:cTn id="1" dur="indefinite" restart="never" nodeType="tmRoot"/>
+      </p:par>
+    </p:tnLst>
+  </p:timing>
+</p:sld>
+</file>
+
+<file path=ppt/slides/slide11.xml><?xml version="1.0" encoding="utf-8"?>
+<p:sld xmlns:a="http://schemas.openxmlformats.org/drawingml/2006/main" xmlns:r="http://schemas.openxmlformats.org/officeDocument/2006/relationships" xmlns:p="http://schemas.openxmlformats.org/presentationml/2006/main">
+  <p:cSld>
+    <p:spTree>
+      <p:nvGrpSpPr>
+        <p:cNvPr id="1" name=""/>
+        <p:cNvGrpSpPr/>
+        <p:nvPr/>
+      </p:nvGrpSpPr>
+      <p:grpSpPr>
+        <a:xfrm>
+          <a:off x="0" y="0"/>
+          <a:ext cx="0" cy="0"/>
+          <a:chOff x="0" y="0"/>
+          <a:chExt cx="0" cy="0"/>
+        </a:xfrm>
+      </p:grpSpPr>
+      <p:sp>
+        <p:nvSpPr>
+          <p:cNvPr id="2" name="Title 1"/>
+          <p:cNvSpPr>
+            <a:spLocks noGrp="1"/>
+          </p:cNvSpPr>
+          <p:nvPr>
+            <p:ph type="title"/>
+          </p:nvPr>
+        </p:nvSpPr>
+        <p:spPr/>
+        <p:txBody>
+          <a:bodyPr>
+            <a:normAutofit/>
+          </a:bodyPr>
+          <a:lstStyle/>
+          <a:p>
+            <a:r>
+              <a:rPr lang="en-US" dirty="0" smtClean="0"/>
+              <a:t>Push</a:t>
+            </a:r>
+            <a:endParaRPr lang="en-SG" dirty="0"/>
+          </a:p>
+        </p:txBody>
+      </p:sp>
+      <p:sp>
+        <p:nvSpPr>
+          <p:cNvPr id="3" name="Content Placeholder 2"/>
+          <p:cNvSpPr>
+            <a:spLocks noGrp="1"/>
+          </p:cNvSpPr>
+          <p:nvPr>
+            <p:ph idx="1"/>
+          </p:nvPr>
+        </p:nvSpPr>
+        <p:spPr/>
+        <p:txBody>
+          <a:bodyPr/>
+          <a:lstStyle/>
+          <a:p>
+            <a:endParaRPr lang="en-SG"/>
+          </a:p>
+        </p:txBody>
+      </p:sp>
+    </p:spTree>
+    <p:extLst>
+      <p:ext uri="{BB962C8B-B14F-4D97-AF65-F5344CB8AC3E}">
+        <p14:creationId xmlns:p14="http://schemas.microsoft.com/office/powerpoint/2010/main" val="355176492"/>
+      </p:ext>
+    </p:extLst>
+  </p:cSld>
+  <p:clrMapOvr>
+    <a:masterClrMapping/>
+  </p:clrMapOvr>
+  <p:timing>
+    <p:tnLst>
+      <p:par>
+        <p:cTn id="1" dur="indefinite" restart="never" nodeType="tmRoot"/>
+      </p:par>
+    </p:tnLst>
+  </p:timing>
+</p:sld>
+</file>
+
+<file path=ppt/slides/slide12.xml><?xml version="1.0" encoding="utf-8"?>
+<p:sld xmlns:a="http://schemas.openxmlformats.org/drawingml/2006/main" xmlns:r="http://schemas.openxmlformats.org/officeDocument/2006/relationships" xmlns:p="http://schemas.openxmlformats.org/presentationml/2006/main">
+  <p:cSld>
+    <p:spTree>
+      <p:nvGrpSpPr>
+        <p:cNvPr id="1" name=""/>
+        <p:cNvGrpSpPr/>
+        <p:nvPr/>
+      </p:nvGrpSpPr>
+      <p:grpSpPr>
+        <a:xfrm>
+          <a:off x="0" y="0"/>
+          <a:ext cx="0" cy="0"/>
+          <a:chOff x="0" y="0"/>
+          <a:chExt cx="0" cy="0"/>
+        </a:xfrm>
+      </p:grpSpPr>
+      <p:sp>
+        <p:nvSpPr>
+          <p:cNvPr id="2" name="Title 1"/>
+          <p:cNvSpPr>
+            <a:spLocks noGrp="1"/>
+          </p:cNvSpPr>
+          <p:nvPr>
+            <p:ph type="title"/>
+          </p:nvPr>
+        </p:nvSpPr>
+        <p:spPr/>
+        <p:txBody>
+          <a:bodyPr>
+            <a:normAutofit/>
+          </a:bodyPr>
+          <a:lstStyle/>
+          <a:p>
+            <a:r>
+              <a:rPr lang="en-US" dirty="0" smtClean="0"/>
+              <a:t>Pull</a:t>
+            </a:r>
+            <a:endParaRPr lang="en-SG" dirty="0"/>
+          </a:p>
+        </p:txBody>
+      </p:sp>
+      <p:sp>
+        <p:nvSpPr>
+          <p:cNvPr id="3" name="Content Placeholder 2"/>
+          <p:cNvSpPr>
+            <a:spLocks noGrp="1"/>
+          </p:cNvSpPr>
+          <p:nvPr>
+            <p:ph idx="1"/>
+          </p:nvPr>
+        </p:nvSpPr>
+        <p:spPr/>
+        <p:txBody>
+          <a:bodyPr/>
+          <a:lstStyle/>
+          <a:p>
+            <a:endParaRPr lang="en-SG"/>
+          </a:p>
+        </p:txBody>
+      </p:sp>
+    </p:spTree>
+    <p:extLst>
+      <p:ext uri="{BB962C8B-B14F-4D97-AF65-F5344CB8AC3E}">
+        <p14:creationId xmlns:p14="http://schemas.microsoft.com/office/powerpoint/2010/main" val="1152120217"/>
+      </p:ext>
+    </p:extLst>
+  </p:cSld>
+  <p:clrMapOvr>
+    <a:masterClrMapping/>
+  </p:clrMapOvr>
+  <p:timing>
+    <p:tnLst>
+      <p:par>
+        <p:cTn id="1" dur="indefinite" restart="never" nodeType="tmRoot"/>
+      </p:par>
+    </p:tnLst>
+  </p:timing>
+</p:sld>
+</file>
+
+<file path=ppt/slides/slide13.xml><?xml version="1.0" encoding="utf-8"?>
+<p:sld xmlns:a="http://schemas.openxmlformats.org/drawingml/2006/main" xmlns:r="http://schemas.openxmlformats.org/officeDocument/2006/relationships" xmlns:p="http://schemas.openxmlformats.org/presentationml/2006/main">
+  <p:cSld>
+    <p:spTree>
+      <p:nvGrpSpPr>
+        <p:cNvPr id="1" name=""/>
+        <p:cNvGrpSpPr/>
+        <p:nvPr/>
+      </p:nvGrpSpPr>
+      <p:grpSpPr>
+        <a:xfrm>
+          <a:off x="0" y="0"/>
+          <a:ext cx="0" cy="0"/>
+          <a:chOff x="0" y="0"/>
+          <a:chExt cx="0" cy="0"/>
+        </a:xfrm>
+      </p:grpSpPr>
+      <p:sp>
+        <p:nvSpPr>
+          <p:cNvPr id="2" name="Title 1"/>
+          <p:cNvSpPr>
+            <a:spLocks noGrp="1"/>
+          </p:cNvSpPr>
+          <p:nvPr>
+            <p:ph type="title"/>
+          </p:nvPr>
+        </p:nvSpPr>
+        <p:spPr/>
+        <p:txBody>
+          <a:bodyPr>
+            <a:normAutofit/>
+          </a:bodyPr>
+          <a:lstStyle/>
+          <a:p>
+            <a:r>
+              <a:rPr lang="en-US" dirty="0" smtClean="0"/>
+              <a:t>Rollback</a:t>
+            </a:r>
+            <a:endParaRPr lang="en-SG" dirty="0"/>
+          </a:p>
+        </p:txBody>
+      </p:sp>
+      <p:sp>
+        <p:nvSpPr>
+          <p:cNvPr id="3" name="Content Placeholder 2"/>
+          <p:cNvSpPr>
+            <a:spLocks noGrp="1"/>
+          </p:cNvSpPr>
+          <p:nvPr>
+            <p:ph idx="1"/>
+          </p:nvPr>
+        </p:nvSpPr>
+        <p:spPr/>
+        <p:txBody>
+          <a:bodyPr/>
+          <a:lstStyle/>
+          <a:p>
+            <a:endParaRPr lang="en-SG"/>
+          </a:p>
+        </p:txBody>
+      </p:sp>
+    </p:spTree>
+    <p:extLst>
+      <p:ext uri="{BB962C8B-B14F-4D97-AF65-F5344CB8AC3E}">
+        <p14:creationId xmlns:p14="http://schemas.microsoft.com/office/powerpoint/2010/main" val="1896517289"/>
+      </p:ext>
+    </p:extLst>
+  </p:cSld>
+  <p:clrMapOvr>
+    <a:masterClrMapping/>
+  </p:clrMapOvr>
+  <p:timing>
+    <p:tnLst>
+      <p:par>
+        <p:cTn id="1" dur="indefinite" restart="never" nodeType="tmRoot"/>
+      </p:par>
+    </p:tnLst>
+  </p:timing>
+</p:sld>
+</file>
+
+<file path=ppt/slides/slide14.xml><?xml version="1.0" encoding="utf-8"?>
+<p:sld xmlns:a="http://schemas.openxmlformats.org/drawingml/2006/main" xmlns:r="http://schemas.openxmlformats.org/officeDocument/2006/relationships" xmlns:p="http://schemas.openxmlformats.org/presentationml/2006/main">
+  <p:cSld>
+    <p:spTree>
+      <p:nvGrpSpPr>
+        <p:cNvPr id="1" name=""/>
+        <p:cNvGrpSpPr/>
+        <p:nvPr/>
+      </p:nvGrpSpPr>
+      <p:grpSpPr>
+        <a:xfrm>
+          <a:off x="0" y="0"/>
+          <a:ext cx="0" cy="0"/>
+          <a:chOff x="0" y="0"/>
+          <a:chExt cx="0" cy="0"/>
+        </a:xfrm>
+      </p:grpSpPr>
+      <p:sp>
+        <p:nvSpPr>
+          <p:cNvPr id="2" name="Title 1"/>
+          <p:cNvSpPr>
+            <a:spLocks noGrp="1"/>
+          </p:cNvSpPr>
+          <p:nvPr>
+            <p:ph type="title"/>
+          </p:nvPr>
+        </p:nvSpPr>
+        <p:spPr/>
+        <p:txBody>
+          <a:bodyPr>
+            <a:normAutofit/>
+          </a:bodyPr>
+          <a:lstStyle/>
+          <a:p>
+            <a:r>
+              <a:rPr lang="en-US" dirty="0" smtClean="0"/>
+              <a:t>Revert</a:t>
+            </a:r>
+            <a:endParaRPr lang="en-SG" dirty="0"/>
+          </a:p>
+        </p:txBody>
+      </p:sp>
+      <p:sp>
+        <p:nvSpPr>
+          <p:cNvPr id="3" name="Content Placeholder 2"/>
+          <p:cNvSpPr>
+            <a:spLocks noGrp="1"/>
+          </p:cNvSpPr>
+          <p:nvPr>
+            <p:ph idx="1"/>
+          </p:nvPr>
+        </p:nvSpPr>
+        <p:spPr/>
+        <p:txBody>
+          <a:bodyPr/>
+          <a:lstStyle/>
+          <a:p>
+            <a:endParaRPr lang="en-SG" dirty="0"/>
+          </a:p>
+        </p:txBody>
+      </p:sp>
+    </p:spTree>
+    <p:extLst>
+      <p:ext uri="{BB962C8B-B14F-4D97-AF65-F5344CB8AC3E}">
+        <p14:creationId xmlns:p14="http://schemas.microsoft.com/office/powerpoint/2010/main" val="3510907948"/>
+      </p:ext>
+    </p:extLst>
+  </p:cSld>
+  <p:clrMapOvr>
+    <a:masterClrMapping/>
+  </p:clrMapOvr>
+  <p:timing>
+    <p:tnLst>
+      <p:par>
+        <p:cTn id="1" dur="indefinite" restart="never" nodeType="tmRoot"/>
+      </p:par>
+    </p:tnLst>
+  </p:timing>
 </p:sld>
 </file>
 
@@ -3217,79 +3681,88 @@
             <p:ph idx="1"/>
           </p:nvPr>
         </p:nvSpPr>
-        <p:spPr/>
+        <p:spPr>
+          <a:xfrm>
+            <a:off x="457200" y="1600200"/>
+            <a:ext cx="8229600" cy="5069160"/>
+          </a:xfrm>
+        </p:spPr>
         <p:txBody>
           <a:bodyPr>
-            <a:normAutofit fontScale="85000" lnSpcReduction="20000"/>
+            <a:noAutofit/>
           </a:bodyPr>
           <a:lstStyle/>
           <a:p>
             <a:r>
-              <a:rPr lang="en-US" dirty="0" smtClean="0"/>
+              <a:rPr lang="en-US" sz="2800" dirty="0" smtClean="0"/>
+              <a:t>Clone Repo</a:t>
+            </a:r>
+          </a:p>
+          <a:p>
+            <a:r>
+              <a:rPr lang="en-US" sz="2800" dirty="0" smtClean="0"/>
               <a:t>Place new file into local repo</a:t>
             </a:r>
           </a:p>
           <a:p>
             <a:r>
-              <a:rPr lang="en-US" dirty="0" smtClean="0"/>
+              <a:rPr lang="en-US" sz="2800" dirty="0" smtClean="0"/>
+              <a:t>Remove </a:t>
+            </a:r>
+            <a:r>
+              <a:rPr lang="en-US" sz="2800" dirty="0"/>
+              <a:t>file from local </a:t>
+            </a:r>
+            <a:r>
+              <a:rPr lang="en-US" sz="2800" dirty="0" smtClean="0"/>
+              <a:t>repo</a:t>
+            </a:r>
+          </a:p>
+          <a:p>
+            <a:r>
+              <a:rPr lang="en-US" sz="2800" dirty="0"/>
+              <a:t>Check </a:t>
+            </a:r>
+            <a:r>
+              <a:rPr lang="en-US" sz="2800" dirty="0" smtClean="0"/>
+              <a:t>status</a:t>
+            </a:r>
+          </a:p>
+          <a:p>
+            <a:r>
+              <a:rPr lang="en-US" sz="2800" dirty="0"/>
+              <a:t>Check diff between 2 versions of the same file</a:t>
+            </a:r>
+          </a:p>
+          <a:p>
+            <a:r>
+              <a:rPr lang="en-US" sz="2800" dirty="0" smtClean="0"/>
               <a:t>Commit changes</a:t>
             </a:r>
           </a:p>
           <a:p>
             <a:r>
-              <a:rPr lang="en-US" dirty="0" smtClean="0"/>
+              <a:rPr lang="en-US" sz="2800" dirty="0" smtClean="0"/>
               <a:t>Push</a:t>
             </a:r>
           </a:p>
           <a:p>
             <a:r>
-              <a:rPr lang="en-US" dirty="0" smtClean="0"/>
+              <a:rPr lang="en-US" sz="2800" dirty="0" smtClean="0"/>
               <a:t>Pull</a:t>
             </a:r>
           </a:p>
           <a:p>
             <a:r>
-              <a:rPr lang="en-US" dirty="0" smtClean="0"/>
-              <a:t>Remove file from local repo</a:t>
-            </a:r>
-          </a:p>
-          <a:p>
-            <a:r>
-              <a:rPr lang="en-US" dirty="0" smtClean="0"/>
+              <a:rPr lang="en-US" sz="2800" dirty="0" smtClean="0"/>
               <a:t>Rollback</a:t>
             </a:r>
           </a:p>
           <a:p>
             <a:r>
-              <a:rPr lang="en-US" dirty="0" smtClean="0"/>
-              <a:t>Check status</a:t>
-            </a:r>
-          </a:p>
-          <a:p>
-            <a:r>
-              <a:rPr lang="en-US" dirty="0" smtClean="0"/>
+              <a:rPr lang="en-US" sz="2800" dirty="0" smtClean="0"/>
               <a:t>Revert</a:t>
             </a:r>
-          </a:p>
-          <a:p>
-            <a:r>
-              <a:rPr lang="en-US" dirty="0" smtClean="0"/>
-              <a:t>Clone Repo</a:t>
-            </a:r>
-          </a:p>
-          <a:p>
-            <a:r>
-              <a:rPr lang="en-US" dirty="0" smtClean="0"/>
-              <a:t>Check diff between 2 versions of </a:t>
-            </a:r>
-            <a:r>
-              <a:rPr lang="en-US" smtClean="0"/>
-              <a:t>the same file</a:t>
-            </a:r>
-            <a:endParaRPr lang="en-US" dirty="0" smtClean="0"/>
-          </a:p>
-          <a:p>
-            <a:endParaRPr lang="en-SG" dirty="0"/>
           </a:p>
         </p:txBody>
       </p:sp>
@@ -3303,6 +3776,13 @@
   <p:clrMapOvr>
     <a:masterClrMapping/>
   </p:clrMapOvr>
+  <p:timing>
+    <p:tnLst>
+      <p:par>
+        <p:cTn id="1" dur="indefinite" restart="never" nodeType="tmRoot"/>
+      </p:par>
+    </p:tnLst>
+  </p:timing>
 </p:sld>
 </file>
 
@@ -3335,10 +3815,20 @@
         </p:nvSpPr>
         <p:spPr/>
         <p:txBody>
-          <a:bodyPr/>
-          <a:lstStyle/>
-          <a:p>
-            <a:endParaRPr lang="en-SG"/>
+          <a:bodyPr>
+            <a:normAutofit/>
+          </a:bodyPr>
+          <a:lstStyle/>
+          <a:p>
+            <a:r>
+              <a:rPr lang="en-US" dirty="0"/>
+              <a:t>Clone </a:t>
+            </a:r>
+            <a:r>
+              <a:rPr lang="en-US" dirty="0" smtClean="0"/>
+              <a:t>Repo</a:t>
+            </a:r>
+            <a:endParaRPr lang="en-SG" dirty="0"/>
           </a:p>
         </p:txBody>
       </p:sp>
@@ -3352,11 +3842,120 @@
             <p:ph idx="1"/>
           </p:nvPr>
         </p:nvSpPr>
-        <p:spPr/>
-        <p:txBody>
-          <a:bodyPr/>
-          <a:lstStyle/>
-          <a:p>
+        <p:spPr>
+          <a:xfrm>
+            <a:off x="467544" y="1340768"/>
+            <a:ext cx="8229600" cy="4525963"/>
+          </a:xfrm>
+        </p:spPr>
+        <p:txBody>
+          <a:bodyPr/>
+          <a:lstStyle/>
+          <a:p>
+            <a:pPr marL="0" indent="0">
+              <a:buNone/>
+            </a:pPr>
+            <a:r>
+              <a:rPr lang="en-US" dirty="0" smtClean="0"/>
+              <a:t>In order to clone someone’s repository on </a:t>
+            </a:r>
+            <a:r>
+              <a:rPr lang="en-US" dirty="0" err="1" smtClean="0"/>
+              <a:t>GitHub</a:t>
+            </a:r>
+            <a:r>
+              <a:rPr lang="en-US" dirty="0" smtClean="0"/>
+              <a:t>, you’ll first need to get the SSH or HTTP link for the repository you want to clone.</a:t>
+            </a:r>
+          </a:p>
+          <a:p>
+            <a:endParaRPr lang="en-SG" dirty="0"/>
+          </a:p>
+        </p:txBody>
+      </p:sp>
+      <p:pic>
+        <p:nvPicPr>
+          <p:cNvPr id="1026" name="Picture 2" descr="C:\xampp\htdocs\programming-notes\Screenshots\Copy RW Access Link from GitHub.JPG"/>
+          <p:cNvPicPr>
+            <a:picLocks noChangeAspect="1" noChangeArrowheads="1"/>
+          </p:cNvPicPr>
+          <p:nvPr/>
+        </p:nvPicPr>
+        <p:blipFill>
+          <a:blip r:embed="rId2">
+            <a:extLst>
+              <a:ext uri="{28A0092B-C50C-407E-A947-70E740481C1C}">
+                <a14:useLocalDpi xmlns:a14="http://schemas.microsoft.com/office/drawing/2010/main" val="0"/>
+              </a:ext>
+            </a:extLst>
+          </a:blip>
+          <a:srcRect/>
+          <a:stretch>
+            <a:fillRect/>
+          </a:stretch>
+        </p:blipFill>
+        <p:spPr bwMode="auto">
+          <a:xfrm>
+            <a:off x="683568" y="2888025"/>
+            <a:ext cx="7560840" cy="3812457"/>
+          </a:xfrm>
+          <a:prstGeom prst="rect">
+            <a:avLst/>
+          </a:prstGeom>
+          <a:noFill/>
+          <a:extLst>
+            <a:ext uri="{909E8E84-426E-40DD-AFC4-6F175D3DCCD1}">
+              <a14:hiddenFill xmlns:a14="http://schemas.microsoft.com/office/drawing/2010/main">
+                <a:solidFill>
+                  <a:srgbClr val="FFFFFF"/>
+                </a:solidFill>
+              </a14:hiddenFill>
+            </a:ext>
+          </a:extLst>
+        </p:spPr>
+      </p:pic>
+      <p:sp>
+        <p:nvSpPr>
+          <p:cNvPr id="4" name="Rectangle 3"/>
+          <p:cNvSpPr/>
+          <p:nvPr/>
+        </p:nvSpPr>
+        <p:spPr>
+          <a:xfrm>
+            <a:off x="4283968" y="3645024"/>
+            <a:ext cx="2808312" cy="504056"/>
+          </a:xfrm>
+          <a:prstGeom prst="rect">
+            <a:avLst/>
+          </a:prstGeom>
+          <a:noFill/>
+          <a:ln>
+            <a:solidFill>
+              <a:srgbClr val="00B050"/>
+            </a:solidFill>
+          </a:ln>
+        </p:spPr>
+        <p:style>
+          <a:lnRef idx="2">
+            <a:schemeClr val="accent1">
+              <a:shade val="50000"/>
+            </a:schemeClr>
+          </a:lnRef>
+          <a:fillRef idx="1">
+            <a:schemeClr val="accent1"/>
+          </a:fillRef>
+          <a:effectRef idx="0">
+            <a:schemeClr val="accent1"/>
+          </a:effectRef>
+          <a:fontRef idx="minor">
+            <a:schemeClr val="lt1"/>
+          </a:fontRef>
+        </p:style>
+        <p:txBody>
+          <a:bodyPr rtlCol="0" anchor="ctr"/>
+          <a:lstStyle/>
+          <a:p>
+            <a:pPr algn="ctr"/>
             <a:endParaRPr lang="en-SG"/>
           </a:p>
         </p:txBody>
@@ -3371,6 +3970,13 @@
   <p:clrMapOvr>
     <a:masterClrMapping/>
   </p:clrMapOvr>
+  <p:timing>
+    <p:tnLst>
+      <p:par>
+        <p:cTn id="1" dur="indefinite" restart="never" nodeType="tmRoot"/>
+      </p:par>
+    </p:tnLst>
+  </p:timing>
 </p:sld>
 </file>
 
@@ -3403,9 +4009,59 @@
         </p:nvSpPr>
         <p:spPr/>
         <p:txBody>
-          <a:bodyPr/>
-          <a:lstStyle/>
-          <a:p>
+          <a:bodyPr>
+            <a:normAutofit/>
+          </a:bodyPr>
+          <a:lstStyle/>
+          <a:p>
+            <a:r>
+              <a:rPr lang="en-US" dirty="0"/>
+              <a:t>Clone </a:t>
+            </a:r>
+            <a:r>
+              <a:rPr lang="en-US" dirty="0" smtClean="0"/>
+              <a:t>Repo</a:t>
+            </a:r>
+            <a:endParaRPr lang="en-SG" dirty="0"/>
+          </a:p>
+        </p:txBody>
+      </p:sp>
+      <p:sp>
+        <p:nvSpPr>
+          <p:cNvPr id="6" name="Rectangle 5"/>
+          <p:cNvSpPr/>
+          <p:nvPr/>
+        </p:nvSpPr>
+        <p:spPr>
+          <a:xfrm>
+            <a:off x="437812" y="2564904"/>
+            <a:ext cx="2694028" cy="504056"/>
+          </a:xfrm>
+          <a:prstGeom prst="rect">
+            <a:avLst/>
+          </a:prstGeom>
+        </p:spPr>
+        <p:style>
+          <a:lnRef idx="2">
+            <a:schemeClr val="dk1">
+              <a:shade val="50000"/>
+            </a:schemeClr>
+          </a:lnRef>
+          <a:fillRef idx="1">
+            <a:schemeClr val="dk1"/>
+          </a:fillRef>
+          <a:effectRef idx="0">
+            <a:schemeClr val="dk1"/>
+          </a:effectRef>
+          <a:fontRef idx="minor">
+            <a:schemeClr val="lt1"/>
+          </a:fontRef>
+        </p:style>
+        <p:txBody>
+          <a:bodyPr rtlCol="0" anchor="ctr"/>
+          <a:lstStyle/>
+          <a:p>
+            <a:pPr algn="ctr"/>
             <a:endParaRPr lang="en-SG"/>
           </a:p>
         </p:txBody>
@@ -3420,25 +4076,126 @@
             <p:ph idx="1"/>
           </p:nvPr>
         </p:nvSpPr>
-        <p:spPr/>
-        <p:txBody>
-          <a:bodyPr/>
-          <a:lstStyle/>
-          <a:p>
-            <a:endParaRPr lang="en-SG"/>
+        <p:spPr>
+          <a:xfrm>
+            <a:off x="467544" y="1340768"/>
+            <a:ext cx="8229600" cy="5256584"/>
+          </a:xfrm>
+        </p:spPr>
+        <p:txBody>
+          <a:bodyPr>
+            <a:normAutofit/>
+          </a:bodyPr>
+          <a:lstStyle/>
+          <a:p>
+            <a:pPr marL="0" indent="0">
+              <a:buNone/>
+            </a:pPr>
+            <a:r>
+              <a:rPr lang="en-US" dirty="0" smtClean="0"/>
+              <a:t>Once you’ve copied that, go to </a:t>
+            </a:r>
+            <a:r>
+              <a:rPr lang="en-US" dirty="0" err="1" smtClean="0"/>
+              <a:t>GitBash</a:t>
+            </a:r>
+            <a:r>
+              <a:rPr lang="en-US" dirty="0" smtClean="0"/>
+              <a:t>.</a:t>
+            </a:r>
+          </a:p>
+          <a:p>
+            <a:pPr marL="0" indent="0">
+              <a:buNone/>
+            </a:pPr>
+            <a:r>
+              <a:rPr lang="en-US" dirty="0" smtClean="0"/>
+              <a:t>Navigate to your project space and type</a:t>
+            </a:r>
+          </a:p>
+          <a:p>
+            <a:pPr marL="0" indent="0">
+              <a:buNone/>
+            </a:pPr>
+            <a:r>
+              <a:rPr lang="en-US" dirty="0" err="1" smtClean="0">
+                <a:solidFill>
+                  <a:srgbClr val="00B050"/>
+                </a:solidFill>
+              </a:rPr>
+              <a:t>git</a:t>
+            </a:r>
+            <a:r>
+              <a:rPr lang="en-US" dirty="0" smtClean="0">
+                <a:solidFill>
+                  <a:srgbClr val="00B050"/>
+                </a:solidFill>
+              </a:rPr>
+              <a:t> clone </a:t>
+            </a:r>
+            <a:r>
+              <a:rPr lang="en-US" dirty="0" smtClean="0">
+                <a:solidFill>
+                  <a:schemeClr val="bg1"/>
+                </a:solidFill>
+              </a:rPr>
+              <a:t>&lt;link&gt;</a:t>
+            </a:r>
+          </a:p>
+          <a:p>
+            <a:pPr marL="0" indent="0">
+              <a:buNone/>
+            </a:pPr>
+            <a:r>
+              <a:rPr lang="en-US" dirty="0" smtClean="0"/>
+              <a:t>Fill in the &lt;link&gt; part with the link you copied and press Enter.</a:t>
+            </a:r>
+          </a:p>
+          <a:p>
+            <a:pPr marL="0" indent="0">
+              <a:buNone/>
+            </a:pPr>
+            <a:r>
+              <a:rPr lang="en-US" dirty="0" smtClean="0"/>
+              <a:t>If you’ve set up the connection to use SSH keys, then </a:t>
+            </a:r>
+            <a:r>
+              <a:rPr lang="en-US" dirty="0" err="1" smtClean="0"/>
+              <a:t>GitBash</a:t>
+            </a:r>
+            <a:r>
+              <a:rPr lang="en-US" dirty="0" smtClean="0"/>
+              <a:t> will prompt you for you passphrase. If not, it will ask for your </a:t>
+            </a:r>
+            <a:r>
+              <a:rPr lang="en-US" dirty="0" err="1" smtClean="0"/>
+              <a:t>GitHub</a:t>
+            </a:r>
+            <a:r>
+              <a:rPr lang="en-US" dirty="0" smtClean="0"/>
+              <a:t> username and password.</a:t>
+            </a:r>
+            <a:endParaRPr lang="en-SG" dirty="0"/>
           </a:p>
         </p:txBody>
       </p:sp>
     </p:spTree>
     <p:extLst>
       <p:ext uri="{BB962C8B-B14F-4D97-AF65-F5344CB8AC3E}">
-        <p14:creationId xmlns:p14="http://schemas.microsoft.com/office/powerpoint/2010/main" val="485328335"/>
+        <p14:creationId xmlns:p14="http://schemas.microsoft.com/office/powerpoint/2010/main" val="2788240166"/>
       </p:ext>
     </p:extLst>
   </p:cSld>
   <p:clrMapOvr>
     <a:masterClrMapping/>
   </p:clrMapOvr>
+  <p:timing>
+    <p:tnLst>
+      <p:par>
+        <p:cTn id="1" dur="indefinite" restart="never" nodeType="tmRoot"/>
+      </p:par>
+    </p:tnLst>
+  </p:timing>
 </p:sld>
 </file>
 
@@ -3471,9 +4228,59 @@
         </p:nvSpPr>
         <p:spPr/>
         <p:txBody>
-          <a:bodyPr/>
-          <a:lstStyle/>
-          <a:p>
+          <a:bodyPr>
+            <a:normAutofit/>
+          </a:bodyPr>
+          <a:lstStyle/>
+          <a:p>
+            <a:r>
+              <a:rPr lang="en-US" dirty="0"/>
+              <a:t>Place new file into local </a:t>
+            </a:r>
+            <a:r>
+              <a:rPr lang="en-US" dirty="0" smtClean="0"/>
+              <a:t>repo</a:t>
+            </a:r>
+            <a:endParaRPr lang="en-SG" dirty="0"/>
+          </a:p>
+        </p:txBody>
+      </p:sp>
+      <p:sp>
+        <p:nvSpPr>
+          <p:cNvPr id="4" name="Rectangle 3"/>
+          <p:cNvSpPr/>
+          <p:nvPr/>
+        </p:nvSpPr>
+        <p:spPr>
+          <a:xfrm>
+            <a:off x="539552" y="3717032"/>
+            <a:ext cx="3384376" cy="504056"/>
+          </a:xfrm>
+          <a:prstGeom prst="rect">
+            <a:avLst/>
+          </a:prstGeom>
+        </p:spPr>
+        <p:style>
+          <a:lnRef idx="2">
+            <a:schemeClr val="dk1">
+              <a:shade val="50000"/>
+            </a:schemeClr>
+          </a:lnRef>
+          <a:fillRef idx="1">
+            <a:schemeClr val="dk1"/>
+          </a:fillRef>
+          <a:effectRef idx="0">
+            <a:schemeClr val="dk1"/>
+          </a:effectRef>
+          <a:fontRef idx="minor">
+            <a:schemeClr val="lt1"/>
+          </a:fontRef>
+        </p:style>
+        <p:txBody>
+          <a:bodyPr rtlCol="0" anchor="ctr"/>
+          <a:lstStyle/>
+          <a:p>
+            <a:pPr algn="ctr"/>
             <a:endParaRPr lang="en-SG"/>
           </a:p>
         </p:txBody>
@@ -3488,25 +4295,107 @@
             <p:ph idx="1"/>
           </p:nvPr>
         </p:nvSpPr>
-        <p:spPr/>
-        <p:txBody>
-          <a:bodyPr/>
-          <a:lstStyle/>
-          <a:p>
-            <a:endParaRPr lang="en-SG"/>
+        <p:spPr>
+          <a:xfrm>
+            <a:off x="539552" y="1600200"/>
+            <a:ext cx="8147248" cy="4525963"/>
+          </a:xfrm>
+        </p:spPr>
+        <p:txBody>
+          <a:bodyPr/>
+          <a:lstStyle/>
+          <a:p>
+            <a:pPr marL="0" indent="0">
+              <a:buNone/>
+            </a:pPr>
+            <a:r>
+              <a:rPr lang="en-US" dirty="0" smtClean="0"/>
+              <a:t>When you create a new file in your project folder, </a:t>
+            </a:r>
+            <a:r>
+              <a:rPr lang="en-US" dirty="0" err="1" smtClean="0"/>
+              <a:t>git</a:t>
+            </a:r>
+            <a:r>
+              <a:rPr lang="en-US" dirty="0" smtClean="0"/>
+              <a:t> will notice it, but will not keep track of it. In order to make </a:t>
+            </a:r>
+            <a:r>
+              <a:rPr lang="en-US" dirty="0" err="1" smtClean="0"/>
+              <a:t>git</a:t>
+            </a:r>
+            <a:r>
+              <a:rPr lang="en-US" dirty="0" smtClean="0"/>
+              <a:t> start tracking the file, you need to type:</a:t>
+            </a:r>
+          </a:p>
+          <a:p>
+            <a:pPr marL="0" indent="0">
+              <a:buNone/>
+            </a:pPr>
+            <a:r>
+              <a:rPr lang="en-US" dirty="0" err="1" smtClean="0">
+                <a:solidFill>
+                  <a:srgbClr val="00B050"/>
+                </a:solidFill>
+              </a:rPr>
+              <a:t>git</a:t>
+            </a:r>
+            <a:r>
+              <a:rPr lang="en-US" dirty="0" smtClean="0">
+                <a:solidFill>
+                  <a:srgbClr val="00B050"/>
+                </a:solidFill>
+              </a:rPr>
+              <a:t> add </a:t>
+            </a:r>
+            <a:r>
+              <a:rPr lang="en-US" dirty="0" smtClean="0">
+                <a:solidFill>
+                  <a:schemeClr val="bg1"/>
+                </a:solidFill>
+              </a:rPr>
+              <a:t>&lt;file name&gt;</a:t>
+            </a:r>
+            <a:endParaRPr lang="en-SG" dirty="0"/>
+          </a:p>
+          <a:p>
+            <a:pPr marL="0" indent="0">
+              <a:buNone/>
+            </a:pPr>
+            <a:r>
+              <a:rPr lang="en-US" dirty="0" smtClean="0"/>
+              <a:t>Just replace the &lt;file name&gt; part with your new file, and </a:t>
+            </a:r>
+            <a:r>
+              <a:rPr lang="en-US" dirty="0" err="1" smtClean="0"/>
+              <a:t>git</a:t>
+            </a:r>
+            <a:r>
+              <a:rPr lang="en-US" dirty="0" smtClean="0"/>
+              <a:t> will start tracking it. </a:t>
+            </a:r>
+            <a:endParaRPr lang="en-US" dirty="0" smtClean="0"/>
           </a:p>
         </p:txBody>
       </p:sp>
     </p:spTree>
     <p:extLst>
       <p:ext uri="{BB962C8B-B14F-4D97-AF65-F5344CB8AC3E}">
-        <p14:creationId xmlns:p14="http://schemas.microsoft.com/office/powerpoint/2010/main" val="3306183281"/>
+        <p14:creationId xmlns:p14="http://schemas.microsoft.com/office/powerpoint/2010/main" val="485328335"/>
       </p:ext>
     </p:extLst>
   </p:cSld>
   <p:clrMapOvr>
     <a:masterClrMapping/>
   </p:clrMapOvr>
+  <p:timing>
+    <p:tnLst>
+      <p:par>
+        <p:cTn id="1" dur="indefinite" restart="never" nodeType="tmRoot"/>
+      </p:par>
+    </p:tnLst>
+  </p:timing>
 </p:sld>
 </file>
 
@@ -3542,7 +4431,356 @@
           <a:bodyPr/>
           <a:lstStyle/>
           <a:p>
-            <a:endParaRPr lang="en-SG"/>
+            <a:r>
+              <a:rPr lang="en-US" dirty="0"/>
+              <a:t>Place new file into local repo</a:t>
+            </a:r>
+            <a:endParaRPr lang="en-SG" dirty="0"/>
+          </a:p>
+        </p:txBody>
+      </p:sp>
+      <p:sp>
+        <p:nvSpPr>
+          <p:cNvPr id="5" name="Rectangle 4"/>
+          <p:cNvSpPr/>
+          <p:nvPr/>
+        </p:nvSpPr>
+        <p:spPr>
+          <a:xfrm>
+            <a:off x="539552" y="2708920"/>
+            <a:ext cx="1368152" cy="504056"/>
+          </a:xfrm>
+          <a:prstGeom prst="rect">
+            <a:avLst/>
+          </a:prstGeom>
+        </p:spPr>
+        <p:style>
+          <a:lnRef idx="2">
+            <a:schemeClr val="dk1">
+              <a:shade val="50000"/>
+            </a:schemeClr>
+          </a:lnRef>
+          <a:fillRef idx="1">
+            <a:schemeClr val="dk1"/>
+          </a:fillRef>
+          <a:effectRef idx="0">
+            <a:schemeClr val="dk1"/>
+          </a:effectRef>
+          <a:fontRef idx="minor">
+            <a:schemeClr val="lt1"/>
+          </a:fontRef>
+        </p:style>
+        <p:txBody>
+          <a:bodyPr rtlCol="0" anchor="ctr"/>
+          <a:lstStyle/>
+          <a:p>
+            <a:pPr algn="ctr"/>
+            <a:endParaRPr lang="en-SG" dirty="0"/>
+          </a:p>
+        </p:txBody>
+      </p:sp>
+      <p:sp>
+        <p:nvSpPr>
+          <p:cNvPr id="6" name="Rectangle 5"/>
+          <p:cNvSpPr/>
+          <p:nvPr/>
+        </p:nvSpPr>
+        <p:spPr>
+          <a:xfrm>
+            <a:off x="2411760" y="2708920"/>
+            <a:ext cx="1584176" cy="504056"/>
+          </a:xfrm>
+          <a:prstGeom prst="rect">
+            <a:avLst/>
+          </a:prstGeom>
+        </p:spPr>
+        <p:style>
+          <a:lnRef idx="2">
+            <a:schemeClr val="dk1">
+              <a:shade val="50000"/>
+            </a:schemeClr>
+          </a:lnRef>
+          <a:fillRef idx="1">
+            <a:schemeClr val="dk1"/>
+          </a:fillRef>
+          <a:effectRef idx="0">
+            <a:schemeClr val="dk1"/>
+          </a:effectRef>
+          <a:fontRef idx="minor">
+            <a:schemeClr val="lt1"/>
+          </a:fontRef>
+        </p:style>
+        <p:txBody>
+          <a:bodyPr rtlCol="0" anchor="ctr"/>
+          <a:lstStyle/>
+          <a:p>
+            <a:pPr algn="ctr"/>
+            <a:endParaRPr lang="en-SG" dirty="0"/>
+          </a:p>
+        </p:txBody>
+      </p:sp>
+      <p:sp>
+        <p:nvSpPr>
+          <p:cNvPr id="3" name="Content Placeholder 2"/>
+          <p:cNvSpPr>
+            <a:spLocks noGrp="1"/>
+          </p:cNvSpPr>
+          <p:nvPr>
+            <p:ph idx="1"/>
+          </p:nvPr>
+        </p:nvSpPr>
+        <p:spPr/>
+        <p:txBody>
+          <a:bodyPr/>
+          <a:lstStyle/>
+          <a:p>
+            <a:pPr marL="0" indent="0">
+              <a:buNone/>
+            </a:pPr>
+            <a:r>
+              <a:rPr lang="en-US" dirty="0" smtClean="0"/>
+              <a:t>If you have multiple files that you want to add all at once, you can type</a:t>
+            </a:r>
+          </a:p>
+          <a:p>
+            <a:pPr marL="0" indent="0">
+              <a:buNone/>
+            </a:pPr>
+            <a:r>
+              <a:rPr lang="en-US" dirty="0" err="1">
+                <a:solidFill>
+                  <a:srgbClr val="00B050"/>
+                </a:solidFill>
+              </a:rPr>
+              <a:t>git</a:t>
+            </a:r>
+            <a:r>
+              <a:rPr lang="en-US" dirty="0">
+                <a:solidFill>
+                  <a:srgbClr val="00B050"/>
+                </a:solidFill>
+              </a:rPr>
+              <a:t> </a:t>
+            </a:r>
+            <a:r>
+              <a:rPr lang="en-US" dirty="0" smtClean="0">
+                <a:solidFill>
+                  <a:srgbClr val="00B050"/>
+                </a:solidFill>
+              </a:rPr>
+              <a:t>add . </a:t>
+            </a:r>
+            <a:r>
+              <a:rPr lang="en-US" dirty="0"/>
+              <a:t>o</a:t>
+            </a:r>
+            <a:r>
+              <a:rPr lang="en-US" dirty="0" smtClean="0"/>
+              <a:t>r </a:t>
+            </a:r>
+            <a:r>
+              <a:rPr lang="en-US" dirty="0" err="1" smtClean="0">
+                <a:solidFill>
+                  <a:srgbClr val="00B050"/>
+                </a:solidFill>
+              </a:rPr>
+              <a:t>git</a:t>
+            </a:r>
+            <a:r>
+              <a:rPr lang="en-US" dirty="0" smtClean="0">
+                <a:solidFill>
+                  <a:srgbClr val="00B050"/>
+                </a:solidFill>
+              </a:rPr>
+              <a:t> add –a</a:t>
+            </a:r>
+          </a:p>
+          <a:p>
+            <a:pPr marL="0" indent="0">
+              <a:buNone/>
+            </a:pPr>
+            <a:endParaRPr lang="en-US" dirty="0" smtClean="0"/>
+          </a:p>
+          <a:p>
+            <a:pPr marL="0" indent="0">
+              <a:buNone/>
+            </a:pPr>
+            <a:r>
+              <a:rPr lang="en-US" dirty="0" smtClean="0"/>
+              <a:t>Now </a:t>
+            </a:r>
+            <a:r>
+              <a:rPr lang="en-US" dirty="0" err="1" smtClean="0"/>
+              <a:t>git</a:t>
+            </a:r>
+            <a:r>
+              <a:rPr lang="en-US" dirty="0" smtClean="0"/>
+              <a:t> will add every single new file it locates within your </a:t>
+            </a:r>
+            <a:r>
+              <a:rPr lang="en-US" smtClean="0"/>
+              <a:t>project folder </a:t>
+            </a:r>
+            <a:r>
+              <a:rPr lang="en-US" dirty="0" smtClean="0"/>
+              <a:t>and start tracking </a:t>
+            </a:r>
+            <a:r>
+              <a:rPr lang="en-US" smtClean="0"/>
+              <a:t>their changes.</a:t>
+            </a:r>
+            <a:endParaRPr lang="en-SG" dirty="0"/>
+          </a:p>
+        </p:txBody>
+      </p:sp>
+    </p:spTree>
+    <p:extLst>
+      <p:ext uri="{BB962C8B-B14F-4D97-AF65-F5344CB8AC3E}">
+        <p14:creationId xmlns:p14="http://schemas.microsoft.com/office/powerpoint/2010/main" val="4043900988"/>
+      </p:ext>
+    </p:extLst>
+  </p:cSld>
+  <p:clrMapOvr>
+    <a:masterClrMapping/>
+  </p:clrMapOvr>
+  <p:timing>
+    <p:tnLst>
+      <p:par>
+        <p:cTn id="1" dur="indefinite" restart="never" nodeType="tmRoot"/>
+      </p:par>
+    </p:tnLst>
+  </p:timing>
+</p:sld>
+</file>
+
+<file path=ppt/slides/slide7.xml><?xml version="1.0" encoding="utf-8"?>
+<p:sld xmlns:a="http://schemas.openxmlformats.org/drawingml/2006/main" xmlns:r="http://schemas.openxmlformats.org/officeDocument/2006/relationships" xmlns:p="http://schemas.openxmlformats.org/presentationml/2006/main">
+  <p:cSld>
+    <p:spTree>
+      <p:nvGrpSpPr>
+        <p:cNvPr id="1" name=""/>
+        <p:cNvGrpSpPr/>
+        <p:nvPr/>
+      </p:nvGrpSpPr>
+      <p:grpSpPr>
+        <a:xfrm>
+          <a:off x="0" y="0"/>
+          <a:ext cx="0" cy="0"/>
+          <a:chOff x="0" y="0"/>
+          <a:chExt cx="0" cy="0"/>
+        </a:xfrm>
+      </p:grpSpPr>
+      <p:sp>
+        <p:nvSpPr>
+          <p:cNvPr id="2" name="Title 1"/>
+          <p:cNvSpPr>
+            <a:spLocks noGrp="1"/>
+          </p:cNvSpPr>
+          <p:nvPr>
+            <p:ph type="title"/>
+          </p:nvPr>
+        </p:nvSpPr>
+        <p:spPr/>
+        <p:txBody>
+          <a:bodyPr>
+            <a:normAutofit/>
+          </a:bodyPr>
+          <a:lstStyle/>
+          <a:p>
+            <a:r>
+              <a:rPr lang="en-US" dirty="0"/>
+              <a:t>Remove file from local </a:t>
+            </a:r>
+            <a:r>
+              <a:rPr lang="en-US" dirty="0" smtClean="0"/>
+              <a:t>repo</a:t>
+            </a:r>
+            <a:endParaRPr lang="en-SG" dirty="0"/>
+          </a:p>
+        </p:txBody>
+      </p:sp>
+      <p:sp>
+        <p:nvSpPr>
+          <p:cNvPr id="3" name="Content Placeholder 2"/>
+          <p:cNvSpPr>
+            <a:spLocks noGrp="1"/>
+          </p:cNvSpPr>
+          <p:nvPr>
+            <p:ph idx="1"/>
+          </p:nvPr>
+        </p:nvSpPr>
+        <p:spPr/>
+        <p:txBody>
+          <a:bodyPr/>
+          <a:lstStyle/>
+          <a:p>
+            <a:endParaRPr lang="en-SG"/>
+          </a:p>
+        </p:txBody>
+      </p:sp>
+    </p:spTree>
+    <p:extLst>
+      <p:ext uri="{BB962C8B-B14F-4D97-AF65-F5344CB8AC3E}">
+        <p14:creationId xmlns:p14="http://schemas.microsoft.com/office/powerpoint/2010/main" val="3306183281"/>
+      </p:ext>
+    </p:extLst>
+  </p:cSld>
+  <p:clrMapOvr>
+    <a:masterClrMapping/>
+  </p:clrMapOvr>
+  <p:timing>
+    <p:tnLst>
+      <p:par>
+        <p:cTn id="1" dur="indefinite" restart="never" nodeType="tmRoot"/>
+      </p:par>
+    </p:tnLst>
+  </p:timing>
+</p:sld>
+</file>
+
+<file path=ppt/slides/slide8.xml><?xml version="1.0" encoding="utf-8"?>
+<p:sld xmlns:a="http://schemas.openxmlformats.org/drawingml/2006/main" xmlns:r="http://schemas.openxmlformats.org/officeDocument/2006/relationships" xmlns:p="http://schemas.openxmlformats.org/presentationml/2006/main">
+  <p:cSld>
+    <p:spTree>
+      <p:nvGrpSpPr>
+        <p:cNvPr id="1" name=""/>
+        <p:cNvGrpSpPr/>
+        <p:nvPr/>
+      </p:nvGrpSpPr>
+      <p:grpSpPr>
+        <a:xfrm>
+          <a:off x="0" y="0"/>
+          <a:ext cx="0" cy="0"/>
+          <a:chOff x="0" y="0"/>
+          <a:chExt cx="0" cy="0"/>
+        </a:xfrm>
+      </p:grpSpPr>
+      <p:sp>
+        <p:nvSpPr>
+          <p:cNvPr id="2" name="Title 1"/>
+          <p:cNvSpPr>
+            <a:spLocks noGrp="1"/>
+          </p:cNvSpPr>
+          <p:nvPr>
+            <p:ph type="title"/>
+          </p:nvPr>
+        </p:nvSpPr>
+        <p:spPr/>
+        <p:txBody>
+          <a:bodyPr>
+            <a:normAutofit/>
+          </a:bodyPr>
+          <a:lstStyle/>
+          <a:p>
+            <a:r>
+              <a:rPr lang="en-US" dirty="0"/>
+              <a:t>Check </a:t>
+            </a:r>
+            <a:r>
+              <a:rPr lang="en-US" dirty="0" smtClean="0"/>
+              <a:t>status</a:t>
+            </a:r>
+            <a:endParaRPr lang="en-SG" dirty="0"/>
           </a:p>
         </p:txBody>
       </p:sp>
@@ -3575,6 +4813,98 @@
   <p:clrMapOvr>
     <a:masterClrMapping/>
   </p:clrMapOvr>
+  <p:timing>
+    <p:tnLst>
+      <p:par>
+        <p:cTn id="1" dur="indefinite" restart="never" nodeType="tmRoot"/>
+      </p:par>
+    </p:tnLst>
+  </p:timing>
+</p:sld>
+</file>
+
+<file path=ppt/slides/slide9.xml><?xml version="1.0" encoding="utf-8"?>
+<p:sld xmlns:a="http://schemas.openxmlformats.org/drawingml/2006/main" xmlns:r="http://schemas.openxmlformats.org/officeDocument/2006/relationships" xmlns:p="http://schemas.openxmlformats.org/presentationml/2006/main">
+  <p:cSld>
+    <p:spTree>
+      <p:nvGrpSpPr>
+        <p:cNvPr id="1" name=""/>
+        <p:cNvGrpSpPr/>
+        <p:nvPr/>
+      </p:nvGrpSpPr>
+      <p:grpSpPr>
+        <a:xfrm>
+          <a:off x="0" y="0"/>
+          <a:ext cx="0" cy="0"/>
+          <a:chOff x="0" y="0"/>
+          <a:chExt cx="0" cy="0"/>
+        </a:xfrm>
+      </p:grpSpPr>
+      <p:sp>
+        <p:nvSpPr>
+          <p:cNvPr id="2" name="Title 1"/>
+          <p:cNvSpPr>
+            <a:spLocks noGrp="1"/>
+          </p:cNvSpPr>
+          <p:nvPr>
+            <p:ph type="title"/>
+          </p:nvPr>
+        </p:nvSpPr>
+        <p:spPr/>
+        <p:txBody>
+          <a:bodyPr>
+            <a:normAutofit fontScale="90000"/>
+          </a:bodyPr>
+          <a:lstStyle/>
+          <a:p>
+            <a:r>
+              <a:rPr lang="en-US" dirty="0"/>
+              <a:t>Check diff between 2 versions of the same </a:t>
+            </a:r>
+            <a:r>
+              <a:rPr lang="en-US" dirty="0" smtClean="0"/>
+              <a:t>file</a:t>
+            </a:r>
+            <a:endParaRPr lang="en-SG" dirty="0"/>
+          </a:p>
+        </p:txBody>
+      </p:sp>
+      <p:sp>
+        <p:nvSpPr>
+          <p:cNvPr id="3" name="Content Placeholder 2"/>
+          <p:cNvSpPr>
+            <a:spLocks noGrp="1"/>
+          </p:cNvSpPr>
+          <p:nvPr>
+            <p:ph idx="1"/>
+          </p:nvPr>
+        </p:nvSpPr>
+        <p:spPr/>
+        <p:txBody>
+          <a:bodyPr/>
+          <a:lstStyle/>
+          <a:p>
+            <a:endParaRPr lang="en-SG"/>
+          </a:p>
+        </p:txBody>
+      </p:sp>
+    </p:spTree>
+    <p:extLst>
+      <p:ext uri="{BB962C8B-B14F-4D97-AF65-F5344CB8AC3E}">
+        <p14:creationId xmlns:p14="http://schemas.microsoft.com/office/powerpoint/2010/main" val="3189587388"/>
+      </p:ext>
+    </p:extLst>
+  </p:cSld>
+  <p:clrMapOvr>
+    <a:masterClrMapping/>
+  </p:clrMapOvr>
+  <p:timing>
+    <p:tnLst>
+      <p:par>
+        <p:cTn id="1" dur="indefinite" restart="never" nodeType="tmRoot"/>
+      </p:par>
+    </p:tnLst>
+  </p:timing>
 </p:sld>
 </file>
 

</xml_diff>

<commit_message>
last 2 sections diff and rollback
</commit_message>
<xml_diff>
--- a/Github Commands.pptx
+++ b/Github Commands.pptx
@@ -4183,6 +4183,46 @@
       </p:sp>
       <p:sp>
         <p:nvSpPr>
+          <p:cNvPr id="4" name="Rectangle 3"/>
+          <p:cNvSpPr/>
+          <p:nvPr/>
+        </p:nvSpPr>
+        <p:spPr>
+          <a:xfrm>
+            <a:off x="539552" y="2708920"/>
+            <a:ext cx="3672408" cy="504056"/>
+          </a:xfrm>
+          <a:prstGeom prst="rect">
+            <a:avLst/>
+          </a:prstGeom>
+        </p:spPr>
+        <p:style>
+          <a:lnRef idx="2">
+            <a:schemeClr val="dk1">
+              <a:shade val="50000"/>
+            </a:schemeClr>
+          </a:lnRef>
+          <a:fillRef idx="1">
+            <a:schemeClr val="dk1"/>
+          </a:fillRef>
+          <a:effectRef idx="0">
+            <a:schemeClr val="dk1"/>
+          </a:effectRef>
+          <a:fontRef idx="minor">
+            <a:schemeClr val="lt1"/>
+          </a:fontRef>
+        </p:style>
+        <p:txBody>
+          <a:bodyPr rtlCol="0" anchor="ctr"/>
+          <a:lstStyle/>
+          <a:p>
+            <a:pPr algn="ctr"/>
+            <a:endParaRPr lang="en-SG" dirty="0"/>
+          </a:p>
+        </p:txBody>
+      </p:sp>
+      <p:sp>
+        <p:nvSpPr>
           <p:cNvPr id="3" name="Content Placeholder 2"/>
           <p:cNvSpPr>
             <a:spLocks noGrp="1"/>
@@ -4196,7 +4236,52 @@
           <a:bodyPr/>
           <a:lstStyle/>
           <a:p>
-            <a:endParaRPr lang="en-SG" dirty="0"/>
+            <a:pPr marL="0" indent="0">
+              <a:buNone/>
+            </a:pPr>
+            <a:r>
+              <a:rPr lang="en-US" dirty="0" smtClean="0"/>
+              <a:t>If you ever need to revert back to a previous commit, you can do so by typing</a:t>
+            </a:r>
+          </a:p>
+          <a:p>
+            <a:pPr marL="0" indent="0">
+              <a:buNone/>
+            </a:pPr>
+            <a:r>
+              <a:rPr lang="en-US" dirty="0" err="1" smtClean="0">
+                <a:solidFill>
+                  <a:srgbClr val="00B050"/>
+                </a:solidFill>
+              </a:rPr>
+              <a:t>git</a:t>
+            </a:r>
+            <a:r>
+              <a:rPr lang="en-US" dirty="0" smtClean="0">
+                <a:solidFill>
+                  <a:srgbClr val="00B050"/>
+                </a:solidFill>
+              </a:rPr>
+              <a:t> revert </a:t>
+            </a:r>
+            <a:r>
+              <a:rPr lang="en-US" dirty="0" smtClean="0">
+                <a:solidFill>
+                  <a:schemeClr val="bg1"/>
+                </a:solidFill>
+              </a:rPr>
+              <a:t>&lt;checksum&gt;</a:t>
+            </a:r>
+          </a:p>
+          <a:p>
+            <a:pPr marL="0" indent="0">
+              <a:buNone/>
+            </a:pPr>
+            <a:r>
+              <a:rPr lang="en-US" dirty="0" smtClean="0"/>
+              <a:t>Of course, you’ll need to find the checksum that marks the commit you want to revert to.</a:t>
+            </a:r>
+            <a:endParaRPr lang="en-US" dirty="0" smtClean="0"/>
           </a:p>
         </p:txBody>
       </p:sp>

</xml_diff>

<commit_message>
renamed branching strat file and renamed title for github commands
</commit_message>
<xml_diff>
--- a/Github Commands.pptx
+++ b/Github Commands.pptx
@@ -6,11 +6,10 @@
   </p:sldMasterIdLst>
   <p:sldIdLst>
     <p:sldId id="256" r:id="rId2"/>
-    <p:sldId id="257" r:id="rId3"/>
-    <p:sldId id="258" r:id="rId4"/>
-    <p:sldId id="259" r:id="rId5"/>
-    <p:sldId id="260" r:id="rId6"/>
-    <p:sldId id="261" r:id="rId7"/>
+    <p:sldId id="258" r:id="rId3"/>
+    <p:sldId id="259" r:id="rId4"/>
+    <p:sldId id="260" r:id="rId5"/>
+    <p:sldId id="261" r:id="rId6"/>
   </p:sldIdLst>
   <p:sldSz cx="9144000" cy="6858000" type="screen4x3"/>
   <p:notesSz cx="6858000" cy="9144000"/>
@@ -293,7 +292,7 @@
           <a:p>
             <a:fld id="{8839E6B8-AE44-4E4D-B3CE-5639A35B70C6}" type="datetimeFigureOut">
               <a:rPr lang="en-SG" smtClean="0"/>
-              <a:t>28/3/2013</a:t>
+              <a:t>1/4/2013</a:t>
             </a:fld>
             <a:endParaRPr lang="en-SG"/>
           </a:p>
@@ -463,7 +462,7 @@
           <a:p>
             <a:fld id="{8839E6B8-AE44-4E4D-B3CE-5639A35B70C6}" type="datetimeFigureOut">
               <a:rPr lang="en-SG" smtClean="0"/>
-              <a:t>28/3/2013</a:t>
+              <a:t>1/4/2013</a:t>
             </a:fld>
             <a:endParaRPr lang="en-SG"/>
           </a:p>
@@ -643,7 +642,7 @@
           <a:p>
             <a:fld id="{8839E6B8-AE44-4E4D-B3CE-5639A35B70C6}" type="datetimeFigureOut">
               <a:rPr lang="en-SG" smtClean="0"/>
-              <a:t>28/3/2013</a:t>
+              <a:t>1/4/2013</a:t>
             </a:fld>
             <a:endParaRPr lang="en-SG"/>
           </a:p>
@@ -813,7 +812,7 @@
           <a:p>
             <a:fld id="{8839E6B8-AE44-4E4D-B3CE-5639A35B70C6}" type="datetimeFigureOut">
               <a:rPr lang="en-SG" smtClean="0"/>
-              <a:t>28/3/2013</a:t>
+              <a:t>1/4/2013</a:t>
             </a:fld>
             <a:endParaRPr lang="en-SG"/>
           </a:p>
@@ -1059,7 +1058,7 @@
           <a:p>
             <a:fld id="{8839E6B8-AE44-4E4D-B3CE-5639A35B70C6}" type="datetimeFigureOut">
               <a:rPr lang="en-SG" smtClean="0"/>
-              <a:t>28/3/2013</a:t>
+              <a:t>1/4/2013</a:t>
             </a:fld>
             <a:endParaRPr lang="en-SG"/>
           </a:p>
@@ -1347,7 +1346,7 @@
           <a:p>
             <a:fld id="{8839E6B8-AE44-4E4D-B3CE-5639A35B70C6}" type="datetimeFigureOut">
               <a:rPr lang="en-SG" smtClean="0"/>
-              <a:t>28/3/2013</a:t>
+              <a:t>1/4/2013</a:t>
             </a:fld>
             <a:endParaRPr lang="en-SG"/>
           </a:p>
@@ -1769,7 +1768,7 @@
           <a:p>
             <a:fld id="{8839E6B8-AE44-4E4D-B3CE-5639A35B70C6}" type="datetimeFigureOut">
               <a:rPr lang="en-SG" smtClean="0"/>
-              <a:t>28/3/2013</a:t>
+              <a:t>1/4/2013</a:t>
             </a:fld>
             <a:endParaRPr lang="en-SG"/>
           </a:p>
@@ -1887,7 +1886,7 @@
           <a:p>
             <a:fld id="{8839E6B8-AE44-4E4D-B3CE-5639A35B70C6}" type="datetimeFigureOut">
               <a:rPr lang="en-SG" smtClean="0"/>
-              <a:t>28/3/2013</a:t>
+              <a:t>1/4/2013</a:t>
             </a:fld>
             <a:endParaRPr lang="en-SG"/>
           </a:p>
@@ -1982,7 +1981,7 @@
           <a:p>
             <a:fld id="{8839E6B8-AE44-4E4D-B3CE-5639A35B70C6}" type="datetimeFigureOut">
               <a:rPr lang="en-SG" smtClean="0"/>
-              <a:t>28/3/2013</a:t>
+              <a:t>1/4/2013</a:t>
             </a:fld>
             <a:endParaRPr lang="en-SG"/>
           </a:p>
@@ -2259,7 +2258,7 @@
           <a:p>
             <a:fld id="{8839E6B8-AE44-4E4D-B3CE-5639A35B70C6}" type="datetimeFigureOut">
               <a:rPr lang="en-SG" smtClean="0"/>
-              <a:t>28/3/2013</a:t>
+              <a:t>1/4/2013</a:t>
             </a:fld>
             <a:endParaRPr lang="en-SG"/>
           </a:p>
@@ -2512,7 +2511,7 @@
           <a:p>
             <a:fld id="{8839E6B8-AE44-4E4D-B3CE-5639A35B70C6}" type="datetimeFigureOut">
               <a:rPr lang="en-SG" smtClean="0"/>
-              <a:t>28/3/2013</a:t>
+              <a:t>1/4/2013</a:t>
             </a:fld>
             <a:endParaRPr lang="en-SG"/>
           </a:p>
@@ -2725,7 +2724,7 @@
           <a:p>
             <a:fld id="{8839E6B8-AE44-4E4D-B3CE-5639A35B70C6}" type="datetimeFigureOut">
               <a:rPr lang="en-SG" smtClean="0"/>
-              <a:t>28/3/2013</a:t>
+              <a:t>1/4/2013</a:t>
             </a:fld>
             <a:endParaRPr lang="en-SG"/>
           </a:p>
@@ -3116,12 +3115,8 @@
           <a:lstStyle/>
           <a:p>
             <a:r>
-              <a:rPr lang="en-US" dirty="0" smtClean="0"/>
-              <a:t>Native </a:t>
-            </a:r>
-            <a:r>
               <a:rPr lang="en-US" dirty="0" err="1" smtClean="0"/>
-              <a:t>Git</a:t>
+              <a:t>Github</a:t>
             </a:r>
             <a:r>
               <a:rPr lang="en-US" dirty="0" smtClean="0"/>
@@ -3148,11 +3143,15 @@
           <a:p>
             <a:r>
               <a:rPr lang="en-US" dirty="0" smtClean="0"/>
-              <a:t>Commands you can use in </a:t>
+              <a:t>Stuff you can do with the </a:t>
             </a:r>
             <a:r>
               <a:rPr lang="en-US" dirty="0" err="1" smtClean="0"/>
-              <a:t>GitBash</a:t>
+              <a:t>github</a:t>
+            </a:r>
+            <a:r>
+              <a:rPr lang="en-US" dirty="0" smtClean="0"/>
+              <a:t> app</a:t>
             </a:r>
             <a:endParaRPr lang="en-SG" dirty="0"/>
           </a:p>
@@ -3203,7 +3202,7 @@
           <a:bodyPr/>
           <a:lstStyle/>
           <a:p>
-            <a:endParaRPr lang="en-SG" dirty="0"/>
+            <a:endParaRPr lang="en-SG"/>
           </a:p>
         </p:txBody>
       </p:sp>
@@ -3219,84 +3218,17 @@
         </p:nvSpPr>
         <p:spPr/>
         <p:txBody>
-          <a:bodyPr>
-            <a:normAutofit fontScale="85000" lnSpcReduction="20000"/>
-          </a:bodyPr>
-          <a:lstStyle/>
-          <a:p>
-            <a:r>
-              <a:rPr lang="en-US" dirty="0" smtClean="0"/>
-              <a:t>Place new file into local repo</a:t>
-            </a:r>
-          </a:p>
-          <a:p>
-            <a:r>
-              <a:rPr lang="en-US" dirty="0" smtClean="0"/>
-              <a:t>Commit changes</a:t>
-            </a:r>
-          </a:p>
-          <a:p>
-            <a:r>
-              <a:rPr lang="en-US" dirty="0" smtClean="0"/>
-              <a:t>Push</a:t>
-            </a:r>
-          </a:p>
-          <a:p>
-            <a:r>
-              <a:rPr lang="en-US" dirty="0" smtClean="0"/>
-              <a:t>Pull</a:t>
-            </a:r>
-          </a:p>
-          <a:p>
-            <a:r>
-              <a:rPr lang="en-US" dirty="0" smtClean="0"/>
-              <a:t>Remove file from local repo</a:t>
-            </a:r>
-          </a:p>
-          <a:p>
-            <a:r>
-              <a:rPr lang="en-US" dirty="0" smtClean="0"/>
-              <a:t>Rollback</a:t>
-            </a:r>
-          </a:p>
-          <a:p>
-            <a:r>
-              <a:rPr lang="en-US" dirty="0" smtClean="0"/>
-              <a:t>Check status</a:t>
-            </a:r>
-          </a:p>
-          <a:p>
-            <a:r>
-              <a:rPr lang="en-US" dirty="0" smtClean="0"/>
-              <a:t>Revert</a:t>
-            </a:r>
-          </a:p>
-          <a:p>
-            <a:r>
-              <a:rPr lang="en-US" dirty="0" smtClean="0"/>
-              <a:t>Clone Repo</a:t>
-            </a:r>
-          </a:p>
-          <a:p>
-            <a:r>
-              <a:rPr lang="en-US" dirty="0" smtClean="0"/>
-              <a:t>Check diff between 2 versions of </a:t>
-            </a:r>
-            <a:r>
-              <a:rPr lang="en-US" smtClean="0"/>
-              <a:t>the same file</a:t>
-            </a:r>
-            <a:endParaRPr lang="en-US" dirty="0" smtClean="0"/>
-          </a:p>
-          <a:p>
-            <a:endParaRPr lang="en-SG" dirty="0"/>
+          <a:bodyPr/>
+          <a:lstStyle/>
+          <a:p>
+            <a:endParaRPr lang="en-SG"/>
           </a:p>
         </p:txBody>
       </p:sp>
     </p:spTree>
     <p:extLst>
       <p:ext uri="{BB962C8B-B14F-4D97-AF65-F5344CB8AC3E}">
-        <p14:creationId xmlns:p14="http://schemas.microsoft.com/office/powerpoint/2010/main" val="1290775316"/>
+        <p14:creationId xmlns:p14="http://schemas.microsoft.com/office/powerpoint/2010/main" val="1409658802"/>
       </p:ext>
     </p:extLst>
   </p:cSld>
@@ -3364,7 +3296,7 @@
     </p:spTree>
     <p:extLst>
       <p:ext uri="{BB962C8B-B14F-4D97-AF65-F5344CB8AC3E}">
-        <p14:creationId xmlns:p14="http://schemas.microsoft.com/office/powerpoint/2010/main" val="1409658802"/>
+        <p14:creationId xmlns:p14="http://schemas.microsoft.com/office/powerpoint/2010/main" val="485328335"/>
       </p:ext>
     </p:extLst>
   </p:cSld>
@@ -3432,7 +3364,7 @@
     </p:spTree>
     <p:extLst>
       <p:ext uri="{BB962C8B-B14F-4D97-AF65-F5344CB8AC3E}">
-        <p14:creationId xmlns:p14="http://schemas.microsoft.com/office/powerpoint/2010/main" val="485328335"/>
+        <p14:creationId xmlns:p14="http://schemas.microsoft.com/office/powerpoint/2010/main" val="3306183281"/>
       </p:ext>
     </p:extLst>
   </p:cSld>
@@ -3443,74 +3375,6 @@
 </file>
 
 <file path=ppt/slides/slide5.xml><?xml version="1.0" encoding="utf-8"?>
-<p:sld xmlns:a="http://schemas.openxmlformats.org/drawingml/2006/main" xmlns:r="http://schemas.openxmlformats.org/officeDocument/2006/relationships" xmlns:p="http://schemas.openxmlformats.org/presentationml/2006/main">
-  <p:cSld>
-    <p:spTree>
-      <p:nvGrpSpPr>
-        <p:cNvPr id="1" name=""/>
-        <p:cNvGrpSpPr/>
-        <p:nvPr/>
-      </p:nvGrpSpPr>
-      <p:grpSpPr>
-        <a:xfrm>
-          <a:off x="0" y="0"/>
-          <a:ext cx="0" cy="0"/>
-          <a:chOff x="0" y="0"/>
-          <a:chExt cx="0" cy="0"/>
-        </a:xfrm>
-      </p:grpSpPr>
-      <p:sp>
-        <p:nvSpPr>
-          <p:cNvPr id="2" name="Title 1"/>
-          <p:cNvSpPr>
-            <a:spLocks noGrp="1"/>
-          </p:cNvSpPr>
-          <p:nvPr>
-            <p:ph type="title"/>
-          </p:nvPr>
-        </p:nvSpPr>
-        <p:spPr/>
-        <p:txBody>
-          <a:bodyPr/>
-          <a:lstStyle/>
-          <a:p>
-            <a:endParaRPr lang="en-SG"/>
-          </a:p>
-        </p:txBody>
-      </p:sp>
-      <p:sp>
-        <p:nvSpPr>
-          <p:cNvPr id="3" name="Content Placeholder 2"/>
-          <p:cNvSpPr>
-            <a:spLocks noGrp="1"/>
-          </p:cNvSpPr>
-          <p:nvPr>
-            <p:ph idx="1"/>
-          </p:nvPr>
-        </p:nvSpPr>
-        <p:spPr/>
-        <p:txBody>
-          <a:bodyPr/>
-          <a:lstStyle/>
-          <a:p>
-            <a:endParaRPr lang="en-SG"/>
-          </a:p>
-        </p:txBody>
-      </p:sp>
-    </p:spTree>
-    <p:extLst>
-      <p:ext uri="{BB962C8B-B14F-4D97-AF65-F5344CB8AC3E}">
-        <p14:creationId xmlns:p14="http://schemas.microsoft.com/office/powerpoint/2010/main" val="3306183281"/>
-      </p:ext>
-    </p:extLst>
-  </p:cSld>
-  <p:clrMapOvr>
-    <a:masterClrMapping/>
-  </p:clrMapOvr>
-</p:sld>
-</file>
-
-<file path=ppt/slides/slide6.xml><?xml version="1.0" encoding="utf-8"?>
 <p:sld xmlns:a="http://schemas.openxmlformats.org/drawingml/2006/main" xmlns:r="http://schemas.openxmlformats.org/officeDocument/2006/relationships" xmlns:p="http://schemas.openxmlformats.org/presentationml/2006/main">
   <p:cSld>
     <p:spTree>

</xml_diff>

<commit_message>
added Formats and Master Page. Changed Native Github Commands to fit master page
</commit_message>
<xml_diff>
--- a/Github Commands.pptx
+++ b/Github Commands.pptx
@@ -3195,6 +3195,13 @@
   <p:clrMapOvr>
     <a:masterClrMapping/>
   </p:clrMapOvr>
+  <p:timing>
+    <p:tnLst>
+      <p:par>
+        <p:cTn id="1" dur="indefinite" restart="never" nodeType="tmRoot"/>
+      </p:par>
+    </p:tnLst>
+  </p:timing>
 </p:sld>
 </file>
 
@@ -3315,6 +3322,13 @@
   <p:clrMapOvr>
     <a:masterClrMapping/>
   </p:clrMapOvr>
+  <p:timing>
+    <p:tnLst>
+      <p:par>
+        <p:cTn id="1" dur="indefinite" restart="never" nodeType="tmRoot"/>
+      </p:par>
+    </p:tnLst>
+  </p:timing>
 </p:sld>
 </file>
 
@@ -3648,6 +3662,13 @@
   <p:clrMapOvr>
     <a:masterClrMapping/>
   </p:clrMapOvr>
+  <p:timing>
+    <p:tnLst>
+      <p:par>
+        <p:cTn id="1" dur="indefinite" restart="never" nodeType="tmRoot"/>
+      </p:par>
+    </p:tnLst>
+  </p:timing>
 </p:sld>
 </file>
 
@@ -3847,6 +3868,13 @@
   <p:clrMapOvr>
     <a:masterClrMapping/>
   </p:clrMapOvr>
+  <p:timing>
+    <p:tnLst>
+      <p:par>
+        <p:cTn id="1" dur="indefinite" restart="never" nodeType="tmRoot"/>
+      </p:par>
+    </p:tnLst>
+  </p:timing>
 </p:sld>
 </file>
 
@@ -3967,6 +3995,13 @@
   <p:clrMapOvr>
     <a:masterClrMapping/>
   </p:clrMapOvr>
+  <p:timing>
+    <p:tnLst>
+      <p:par>
+        <p:cTn id="1" dur="indefinite" restart="never" nodeType="tmRoot"/>
+      </p:par>
+    </p:tnLst>
+  </p:timing>
 </p:sld>
 </file>
 
@@ -4111,6 +4146,13 @@
   <p:clrMapOvr>
     <a:masterClrMapping/>
   </p:clrMapOvr>
+  <p:timing>
+    <p:tnLst>
+      <p:par>
+        <p:cTn id="1" dur="indefinite" restart="never" nodeType="tmRoot"/>
+      </p:par>
+    </p:tnLst>
+  </p:timing>
 </p:sld>
 </file>
 
@@ -4230,6 +4272,13 @@
   <p:clrMapOvr>
     <a:masterClrMapping/>
   </p:clrMapOvr>
+  <p:timing>
+    <p:tnLst>
+      <p:par>
+        <p:cTn id="1" dur="indefinite" restart="never" nodeType="tmRoot"/>
+      </p:par>
+    </p:tnLst>
+  </p:timing>
 </p:sld>
 </file>
 
@@ -4358,6 +4407,13 @@
   <p:clrMapOvr>
     <a:masterClrMapping/>
   </p:clrMapOvr>
+  <p:timing>
+    <p:tnLst>
+      <p:par>
+        <p:cTn id="1" dur="indefinite" restart="never" nodeType="tmRoot"/>
+      </p:par>
+    </p:tnLst>
+  </p:timing>
 </p:sld>
 </file>
 
@@ -4482,6 +4538,13 @@
   <p:clrMapOvr>
     <a:masterClrMapping/>
   </p:clrMapOvr>
+  <p:timing>
+    <p:tnLst>
+      <p:par>
+        <p:cTn id="1" dur="indefinite" restart="never" nodeType="tmRoot"/>
+      </p:par>
+    </p:tnLst>
+  </p:timing>
 </p:sld>
 </file>
 
@@ -4590,6 +4653,13 @@
   <p:clrMapOvr>
     <a:masterClrMapping/>
   </p:clrMapOvr>
+  <p:timing>
+    <p:tnLst>
+      <p:par>
+        <p:cTn id="1" dur="indefinite" restart="never" nodeType="tmRoot"/>
+      </p:par>
+    </p:tnLst>
+  </p:timing>
 </p:sld>
 </file>
 
@@ -4774,6 +4844,13 @@
   <p:clrMapOvr>
     <a:masterClrMapping/>
   </p:clrMapOvr>
+  <p:timing>
+    <p:tnLst>
+      <p:par>
+        <p:cTn id="1" dur="indefinite" restart="never" nodeType="tmRoot"/>
+      </p:par>
+    </p:tnLst>
+  </p:timing>
 </p:sld>
 </file>
 
@@ -4835,6 +4912,13 @@
   <p:clrMapOvr>
     <a:masterClrMapping/>
   </p:clrMapOvr>
+  <p:timing>
+    <p:tnLst>
+      <p:par>
+        <p:cTn id="1" dur="indefinite" restart="never" nodeType="tmRoot"/>
+      </p:par>
+    </p:tnLst>
+  </p:timing>
 </p:sld>
 </file>
 
@@ -4973,6 +5057,13 @@
   <p:clrMapOvr>
     <a:masterClrMapping/>
   </p:clrMapOvr>
+  <p:timing>
+    <p:tnLst>
+      <p:par>
+        <p:cTn id="1" dur="indefinite" restart="never" nodeType="tmRoot"/>
+      </p:par>
+    </p:tnLst>
+  </p:timing>
 </p:sld>
 </file>
 
@@ -5095,6 +5186,13 @@
   <p:clrMapOvr>
     <a:masterClrMapping/>
   </p:clrMapOvr>
+  <p:timing>
+    <p:tnLst>
+      <p:par>
+        <p:cTn id="1" dur="indefinite" restart="never" nodeType="tmRoot"/>
+      </p:par>
+    </p:tnLst>
+  </p:timing>
 </p:sld>
 </file>
 
@@ -5249,6 +5347,13 @@
   <p:clrMapOvr>
     <a:masterClrMapping/>
   </p:clrMapOvr>
+  <p:timing>
+    <p:tnLst>
+      <p:par>
+        <p:cTn id="1" dur="indefinite" restart="never" nodeType="tmRoot"/>
+      </p:par>
+    </p:tnLst>
+  </p:timing>
 </p:sld>
 </file>
 
@@ -5387,6 +5492,13 @@
   <p:clrMapOvr>
     <a:masterClrMapping/>
   </p:clrMapOvr>
+  <p:timing>
+    <p:tnLst>
+      <p:par>
+        <p:cTn id="1" dur="indefinite" restart="never" nodeType="tmRoot"/>
+      </p:par>
+    </p:tnLst>
+  </p:timing>
 </p:sld>
 </file>
 
@@ -5526,6 +5638,13 @@
   <p:clrMapOvr>
     <a:masterClrMapping/>
   </p:clrMapOvr>
+  <p:timing>
+    <p:tnLst>
+      <p:par>
+        <p:cTn id="1" dur="indefinite" restart="never" nodeType="tmRoot"/>
+      </p:par>
+    </p:tnLst>
+  </p:timing>
 </p:sld>
 </file>
 
@@ -5672,6 +5791,13 @@
   <p:clrMapOvr>
     <a:masterClrMapping/>
   </p:clrMapOvr>
+  <p:timing>
+    <p:tnLst>
+      <p:par>
+        <p:cTn id="1" dur="indefinite" restart="never" nodeType="tmRoot"/>
+      </p:par>
+    </p:tnLst>
+  </p:timing>
 </p:sld>
 </file>
 
@@ -5800,6 +5926,13 @@
   <p:clrMapOvr>
     <a:masterClrMapping/>
   </p:clrMapOvr>
+  <p:timing>
+    <p:tnLst>
+      <p:par>
+        <p:cTn id="1" dur="indefinite" restart="never" nodeType="tmRoot"/>
+      </p:par>
+    </p:tnLst>
+  </p:timing>
 </p:sld>
 </file>
 
@@ -5962,6 +6095,13 @@
   <p:clrMapOvr>
     <a:masterClrMapping/>
   </p:clrMapOvr>
+  <p:timing>
+    <p:tnLst>
+      <p:par>
+        <p:cTn id="1" dur="indefinite" restart="never" nodeType="tmRoot"/>
+      </p:par>
+    </p:tnLst>
+  </p:timing>
 </p:sld>
 </file>
 
@@ -6153,6 +6293,13 @@
   <p:clrMapOvr>
     <a:masterClrMapping/>
   </p:clrMapOvr>
+  <p:timing>
+    <p:tnLst>
+      <p:par>
+        <p:cTn id="1" dur="indefinite" restart="never" nodeType="tmRoot"/>
+      </p:par>
+    </p:tnLst>
+  </p:timing>
 </p:sld>
 </file>
 
@@ -6314,6 +6461,13 @@
   <p:clrMapOvr>
     <a:masterClrMapping/>
   </p:clrMapOvr>
+  <p:timing>
+    <p:tnLst>
+      <p:par>
+        <p:cTn id="1" dur="indefinite" restart="never" nodeType="tmRoot"/>
+      </p:par>
+    </p:tnLst>
+  </p:timing>
 </p:sld>
 </file>
 
@@ -6407,6 +6561,13 @@
   <p:clrMapOvr>
     <a:masterClrMapping/>
   </p:clrMapOvr>
+  <p:timing>
+    <p:tnLst>
+      <p:par>
+        <p:cTn id="1" dur="indefinite" restart="never" nodeType="tmRoot"/>
+      </p:par>
+    </p:tnLst>
+  </p:timing>
 </p:sld>
 </file>
 
@@ -6568,6 +6729,13 @@
   <p:clrMapOvr>
     <a:masterClrMapping/>
   </p:clrMapOvr>
+  <p:timing>
+    <p:tnLst>
+      <p:par>
+        <p:cTn id="1" dur="indefinite" restart="never" nodeType="tmRoot"/>
+      </p:par>
+    </p:tnLst>
+  </p:timing>
 </p:sld>
 </file>
 
@@ -6737,6 +6905,13 @@
   <p:clrMapOvr>
     <a:masterClrMapping/>
   </p:clrMapOvr>
+  <p:timing>
+    <p:tnLst>
+      <p:par>
+        <p:cTn id="1" dur="indefinite" restart="never" nodeType="tmRoot"/>
+      </p:par>
+    </p:tnLst>
+  </p:timing>
 </p:sld>
 </file>
 
@@ -6890,6 +7065,13 @@
   <p:clrMapOvr>
     <a:masterClrMapping/>
   </p:clrMapOvr>
+  <p:timing>
+    <p:tnLst>
+      <p:par>
+        <p:cTn id="1" dur="indefinite" restart="never" nodeType="tmRoot"/>
+      </p:par>
+    </p:tnLst>
+  </p:timing>
 </p:sld>
 </file>
 
@@ -7051,6 +7233,13 @@
   <p:clrMapOvr>
     <a:masterClrMapping/>
   </p:clrMapOvr>
+  <p:timing>
+    <p:tnLst>
+      <p:par>
+        <p:cTn id="1" dur="indefinite" restart="never" nodeType="tmRoot"/>
+      </p:par>
+    </p:tnLst>
+  </p:timing>
 </p:sld>
 </file>
 
@@ -7246,8 +7435,8 @@
               <a:t>Creating a </a:t>
             </a:r>
             <a:r>
-              <a:rPr lang="en-US" dirty="0" err="1" smtClean="0"/>
-              <a:t>Repositary</a:t>
+              <a:rPr lang="en-US" dirty="0" smtClean="0"/>
+              <a:t>Repository</a:t>
             </a:r>
             <a:endParaRPr lang="en-SG" dirty="0"/>
           </a:p>
@@ -7537,7 +7726,9 @@
           </a:xfrm>
         </p:spPr>
         <p:txBody>
-          <a:bodyPr/>
+          <a:bodyPr>
+            <a:normAutofit/>
+          </a:bodyPr>
           <a:lstStyle/>
           <a:p>
             <a:r>
@@ -7545,8 +7736,8 @@
               <a:t>Creating a </a:t>
             </a:r>
             <a:r>
-              <a:rPr lang="en-US" dirty="0" err="1" smtClean="0"/>
-              <a:t>Repositary</a:t>
+              <a:rPr lang="en-US" dirty="0" smtClean="0"/>
+              <a:t>Repository</a:t>
             </a:r>
             <a:endParaRPr lang="en-SG" dirty="0"/>
           </a:p>
@@ -7916,6 +8107,13 @@
   <p:clrMapOvr>
     <a:masterClrMapping/>
   </p:clrMapOvr>
+  <p:timing>
+    <p:tnLst>
+      <p:par>
+        <p:cTn id="1" dur="indefinite" restart="never" nodeType="tmRoot"/>
+      </p:par>
+    </p:tnLst>
+  </p:timing>
 </p:sld>
 </file>
 
@@ -7961,8 +8159,8 @@
               <a:t>Creating a </a:t>
             </a:r>
             <a:r>
-              <a:rPr lang="en-US" dirty="0" err="1" smtClean="0"/>
-              <a:t>Repositary</a:t>
+              <a:rPr lang="en-US" dirty="0" smtClean="0"/>
+              <a:t>Repository</a:t>
             </a:r>
             <a:endParaRPr lang="en-SG" dirty="0"/>
           </a:p>
@@ -8040,6 +8238,13 @@
   <p:clrMapOvr>
     <a:masterClrMapping/>
   </p:clrMapOvr>
+  <p:timing>
+    <p:tnLst>
+      <p:par>
+        <p:cTn id="1" dur="indefinite" restart="never" nodeType="tmRoot"/>
+      </p:par>
+    </p:tnLst>
+  </p:timing>
 </p:sld>
 </file>
 
@@ -8085,8 +8290,8 @@
               <a:t>Creating a </a:t>
             </a:r>
             <a:r>
-              <a:rPr lang="en-US" dirty="0" err="1" smtClean="0"/>
-              <a:t>Repositary</a:t>
+              <a:rPr lang="en-US" dirty="0" smtClean="0"/>
+              <a:t>Repository</a:t>
             </a:r>
             <a:endParaRPr lang="en-SG" dirty="0"/>
           </a:p>
@@ -8180,6 +8385,13 @@
   <p:clrMapOvr>
     <a:masterClrMapping/>
   </p:clrMapOvr>
+  <p:timing>
+    <p:tnLst>
+      <p:par>
+        <p:cTn id="1" dur="indefinite" restart="never" nodeType="tmRoot"/>
+      </p:par>
+    </p:tnLst>
+  </p:timing>
 </p:sld>
 </file>
 
@@ -8472,6 +8684,13 @@
   <p:clrMapOvr>
     <a:masterClrMapping/>
   </p:clrMapOvr>
+  <p:timing>
+    <p:tnLst>
+      <p:par>
+        <p:cTn id="1" dur="indefinite" restart="never" nodeType="tmRoot"/>
+      </p:par>
+    </p:tnLst>
+  </p:timing>
 </p:sld>
 </file>
 

</xml_diff>